<commit_message>
jeroen is er nu wel
</commit_message>
<xml_diff>
--- a/Presentaties/Final/TestDesign v01/8dec.pptx
+++ b/Presentaties/Final/TestDesign v01/8dec.pptx
@@ -146,7 +146,7 @@
 <file path=ppt/charts/chart1.xml><?xml version="1.0" encoding="utf-8"?>
 <c:chartSpace xmlns:c="http://schemas.openxmlformats.org/drawingml/2006/chart" xmlns:a="http://schemas.openxmlformats.org/drawingml/2006/main" xmlns:r="http://schemas.openxmlformats.org/officeDocument/2006/relationships">
   <c:date1904 val="0"/>
-  <c:lang val="nl-NL"/>
+  <c:lang val="en-US"/>
   <c:roundedCorners val="0"/>
   <mc:AlternateContent xmlns:mc="http://schemas.openxmlformats.org/markup-compatibility/2006">
     <mc:Choice xmlns:c14="http://schemas.microsoft.com/office/drawing/2007/8/2/chart" Requires="c14">
@@ -839,64 +839,64 @@
                 <c:formatCode>General</c:formatCode>
                 <c:ptCount val="50"/>
                 <c:pt idx="0">
-                  <c:v>1.0</c:v>
+                  <c:v>1</c:v>
                 </c:pt>
                 <c:pt idx="1">
-                  <c:v>2.0</c:v>
+                  <c:v>2</c:v>
                 </c:pt>
                 <c:pt idx="2">
-                  <c:v>3.0</c:v>
+                  <c:v>3</c:v>
                 </c:pt>
                 <c:pt idx="3">
-                  <c:v>4.0</c:v>
+                  <c:v>4</c:v>
                 </c:pt>
                 <c:pt idx="4">
-                  <c:v>5.0</c:v>
+                  <c:v>5</c:v>
                 </c:pt>
                 <c:pt idx="5">
-                  <c:v>6.0</c:v>
+                  <c:v>6</c:v>
                 </c:pt>
                 <c:pt idx="6">
-                  <c:v>7.0</c:v>
+                  <c:v>7</c:v>
                 </c:pt>
                 <c:pt idx="7">
-                  <c:v>8.0</c:v>
+                  <c:v>8</c:v>
                 </c:pt>
                 <c:pt idx="8">
-                  <c:v>9.0</c:v>
+                  <c:v>9</c:v>
                 </c:pt>
                 <c:pt idx="9">
-                  <c:v>10.0</c:v>
+                  <c:v>10</c:v>
                 </c:pt>
                 <c:pt idx="10">
-                  <c:v>11.0</c:v>
+                  <c:v>11</c:v>
                 </c:pt>
                 <c:pt idx="11">
-                  <c:v>12.0</c:v>
+                  <c:v>12</c:v>
                 </c:pt>
                 <c:pt idx="12">
-                  <c:v>13.0</c:v>
+                  <c:v>13</c:v>
                 </c:pt>
                 <c:pt idx="13">
-                  <c:v>14.0</c:v>
+                  <c:v>14</c:v>
                 </c:pt>
                 <c:pt idx="14">
-                  <c:v>15.0</c:v>
+                  <c:v>15</c:v>
                 </c:pt>
                 <c:pt idx="15">
-                  <c:v>16.0</c:v>
+                  <c:v>16</c:v>
                 </c:pt>
                 <c:pt idx="16">
-                  <c:v>17.0</c:v>
+                  <c:v>17</c:v>
                 </c:pt>
                 <c:pt idx="17">
-                  <c:v>18.0</c:v>
+                  <c:v>18</c:v>
                 </c:pt>
                 <c:pt idx="18">
-                  <c:v>19.0</c:v>
+                  <c:v>19</c:v>
                 </c:pt>
                 <c:pt idx="19">
-                  <c:v>20.0</c:v>
+                  <c:v>20</c:v>
                 </c:pt>
               </c:numCache>
             </c:numRef>
@@ -1099,7 +1099,7 @@
       <a:pPr>
         <a:defRPr/>
       </a:pPr>
-      <a:endParaRPr lang="nl-NL"/>
+      <a:endParaRPr lang="en-US"/>
     </a:p>
   </c:txPr>
   <c:externalData r:id="rId3">
@@ -1111,7 +1111,7 @@
 <file path=ppt/charts/chart10.xml><?xml version="1.0" encoding="utf-8"?>
 <c:chartSpace xmlns:c="http://schemas.openxmlformats.org/drawingml/2006/chart" xmlns:a="http://schemas.openxmlformats.org/drawingml/2006/main" xmlns:r="http://schemas.openxmlformats.org/officeDocument/2006/relationships">
   <c:date1904 val="0"/>
-  <c:lang val="nl-NL"/>
+  <c:lang val="en-US"/>
   <c:roundedCorners val="0"/>
   <mc:AlternateContent xmlns:mc="http://schemas.openxmlformats.org/markup-compatibility/2006">
     <mc:Choice xmlns:c14="http://schemas.microsoft.com/office/drawing/2007/8/2/chart" Requires="c14">
@@ -1229,7 +1229,7 @@
                     <a:cs typeface="+mn-cs"/>
                   </a:defRPr>
                 </a:pPr>
-                <a:endParaRPr lang="nl-NL"/>
+                <a:endParaRPr lang="en-US"/>
               </a:p>
             </c:txPr>
             <c:showLegendKey val="0"/>
@@ -1410,7 +1410,7 @@
                     <a:cs typeface="+mn-cs"/>
                   </a:defRPr>
                 </a:pPr>
-                <a:endParaRPr lang="nl-NL"/>
+                <a:endParaRPr lang="en-US"/>
               </a:p>
             </c:txPr>
             <c:showLegendKey val="0"/>
@@ -1496,7 +1496,7 @@
       <a:pPr>
         <a:defRPr/>
       </a:pPr>
-      <a:endParaRPr lang="nl-NL"/>
+      <a:endParaRPr lang="en-US"/>
     </a:p>
   </c:txPr>
   <c:externalData r:id="rId3">
@@ -1508,7 +1508,7 @@
 <file path=ppt/charts/chart2.xml><?xml version="1.0" encoding="utf-8"?>
 <c:chartSpace xmlns:c="http://schemas.openxmlformats.org/drawingml/2006/chart" xmlns:a="http://schemas.openxmlformats.org/drawingml/2006/main" xmlns:r="http://schemas.openxmlformats.org/officeDocument/2006/relationships">
   <c:date1904 val="0"/>
-  <c:lang val="nl-NL"/>
+  <c:lang val="en-US"/>
   <c:roundedCorners val="0"/>
   <mc:AlternateContent xmlns:mc="http://schemas.openxmlformats.org/markup-compatibility/2006">
     <mc:Choice xmlns:c14="http://schemas.microsoft.com/office/drawing/2007/8/2/chart" Requires="c14">
@@ -1587,28 +1587,28 @@
                 <c:formatCode>General</c:formatCode>
                 <c:ptCount val="8"/>
                 <c:pt idx="0">
-                  <c:v>0.0</c:v>
+                  <c:v>0</c:v>
                 </c:pt>
                 <c:pt idx="1">
-                  <c:v>12.0</c:v>
+                  <c:v>12</c:v>
                 </c:pt>
                 <c:pt idx="2">
-                  <c:v>10.0</c:v>
+                  <c:v>10</c:v>
                 </c:pt>
                 <c:pt idx="3">
-                  <c:v>18.0</c:v>
+                  <c:v>18</c:v>
                 </c:pt>
                 <c:pt idx="4">
-                  <c:v>14.0</c:v>
+                  <c:v>14</c:v>
                 </c:pt>
                 <c:pt idx="5">
-                  <c:v>26.0</c:v>
+                  <c:v>26</c:v>
                 </c:pt>
                 <c:pt idx="6">
-                  <c:v>13.0</c:v>
+                  <c:v>13</c:v>
                 </c:pt>
                 <c:pt idx="7">
-                  <c:v>0.0</c:v>
+                  <c:v>0</c:v>
                 </c:pt>
               </c:numCache>
             </c:numRef>
@@ -1622,11 +1622,11 @@
           <c:showPercent val="0"/>
           <c:showBubbleSize val="0"/>
         </c:dLbls>
-        <c:axId val="-1993825632"/>
-        <c:axId val="-1993693728"/>
+        <c:axId val="-251649728"/>
+        <c:axId val="-251654080"/>
       </c:areaChart>
       <c:catAx>
-        <c:axId val="-1993825632"/>
+        <c:axId val="-251649728"/>
         <c:scaling>
           <c:orientation val="minMax"/>
         </c:scaling>
@@ -1666,10 +1666,10 @@
                 <a:cs typeface="+mn-cs"/>
               </a:defRPr>
             </a:pPr>
-            <a:endParaRPr lang="nl-NL"/>
+            <a:endParaRPr lang="en-US"/>
           </a:p>
         </c:txPr>
-        <c:crossAx val="-1993693728"/>
+        <c:crossAx val="-251654080"/>
         <c:crosses val="autoZero"/>
         <c:auto val="1"/>
         <c:lblAlgn val="ctr"/>
@@ -1677,7 +1677,7 @@
         <c:noMultiLvlLbl val="0"/>
       </c:catAx>
       <c:valAx>
-        <c:axId val="-1993693728"/>
+        <c:axId val="-251654080"/>
         <c:scaling>
           <c:orientation val="minMax"/>
         </c:scaling>
@@ -1711,10 +1711,10 @@
                 <a:cs typeface="+mn-cs"/>
               </a:defRPr>
             </a:pPr>
-            <a:endParaRPr lang="nl-NL"/>
+            <a:endParaRPr lang="en-US"/>
           </a:p>
         </c:txPr>
-        <c:crossAx val="-1993825632"/>
+        <c:crossAx val="-251649728"/>
         <c:crosses val="autoZero"/>
         <c:crossBetween val="midCat"/>
       </c:valAx>
@@ -1744,7 +1744,7 @@
       <a:pPr>
         <a:defRPr/>
       </a:pPr>
-      <a:endParaRPr lang="nl-NL"/>
+      <a:endParaRPr lang="en-US"/>
     </a:p>
   </c:txPr>
   <c:externalData r:id="rId3">
@@ -1756,7 +1756,7 @@
 <file path=ppt/charts/chart3.xml><?xml version="1.0" encoding="utf-8"?>
 <c:chartSpace xmlns:c="http://schemas.openxmlformats.org/drawingml/2006/chart" xmlns:a="http://schemas.openxmlformats.org/drawingml/2006/main" xmlns:r="http://schemas.openxmlformats.org/officeDocument/2006/relationships">
   <c:date1904 val="0"/>
-  <c:lang val="nl-NL"/>
+  <c:lang val="en-US"/>
   <c:roundedCorners val="0"/>
   <mc:AlternateContent xmlns:mc="http://schemas.openxmlformats.org/markup-compatibility/2006">
     <mc:Choice xmlns:c14="http://schemas.microsoft.com/office/drawing/2007/8/2/chart" Requires="c14">
@@ -1832,25 +1832,25 @@
                 <c:formatCode>General</c:formatCode>
                 <c:ptCount val="7"/>
                 <c:pt idx="0">
-                  <c:v>16.0</c:v>
+                  <c:v>16</c:v>
                 </c:pt>
                 <c:pt idx="1">
-                  <c:v>32.0</c:v>
+                  <c:v>32</c:v>
                 </c:pt>
                 <c:pt idx="2">
-                  <c:v>22.0</c:v>
+                  <c:v>22</c:v>
                 </c:pt>
                 <c:pt idx="3">
-                  <c:v>34.0</c:v>
+                  <c:v>34</c:v>
                 </c:pt>
                 <c:pt idx="4">
-                  <c:v>26.0</c:v>
+                  <c:v>26</c:v>
                 </c:pt>
                 <c:pt idx="5">
-                  <c:v>40.0</c:v>
+                  <c:v>40</c:v>
                 </c:pt>
                 <c:pt idx="6">
-                  <c:v>16.0</c:v>
+                  <c:v>16</c:v>
                 </c:pt>
               </c:numCache>
             </c:numRef>
@@ -1864,11 +1864,11 @@
           <c:showPercent val="0"/>
           <c:showBubbleSize val="0"/>
         </c:dLbls>
-        <c:axId val="-2049178624"/>
-        <c:axId val="-2049189216"/>
+        <c:axId val="-464613200"/>
+        <c:axId val="-147430464"/>
       </c:areaChart>
       <c:catAx>
-        <c:axId val="-2049178624"/>
+        <c:axId val="-464613200"/>
         <c:scaling>
           <c:orientation val="minMax"/>
         </c:scaling>
@@ -1908,10 +1908,10 @@
                 <a:cs typeface="+mn-cs"/>
               </a:defRPr>
             </a:pPr>
-            <a:endParaRPr lang="nl-NL"/>
+            <a:endParaRPr lang="en-US"/>
           </a:p>
         </c:txPr>
-        <c:crossAx val="-2049189216"/>
+        <c:crossAx val="-147430464"/>
         <c:crosses val="autoZero"/>
         <c:auto val="1"/>
         <c:lblAlgn val="ctr"/>
@@ -1919,10 +1919,10 @@
         <c:noMultiLvlLbl val="0"/>
       </c:catAx>
       <c:valAx>
-        <c:axId val="-2049189216"/>
+        <c:axId val="-147430464"/>
         <c:scaling>
           <c:orientation val="minMax"/>
-          <c:min val="16.0"/>
+          <c:min val="16"/>
         </c:scaling>
         <c:delete val="0"/>
         <c:axPos val="l"/>
@@ -1954,10 +1954,10 @@
                 <a:cs typeface="+mn-cs"/>
               </a:defRPr>
             </a:pPr>
-            <a:endParaRPr lang="nl-NL"/>
+            <a:endParaRPr lang="en-US"/>
           </a:p>
         </c:txPr>
-        <c:crossAx val="-2049178624"/>
+        <c:crossAx val="-464613200"/>
         <c:crosses val="autoZero"/>
         <c:crossBetween val="midCat"/>
       </c:valAx>
@@ -1987,7 +1987,7 @@
       <a:pPr>
         <a:defRPr/>
       </a:pPr>
-      <a:endParaRPr lang="nl-NL"/>
+      <a:endParaRPr lang="en-US"/>
     </a:p>
   </c:txPr>
   <c:externalData r:id="rId3">
@@ -1999,7 +1999,7 @@
 <file path=ppt/charts/chart4.xml><?xml version="1.0" encoding="utf-8"?>
 <c:chartSpace xmlns:c="http://schemas.openxmlformats.org/drawingml/2006/chart" xmlns:a="http://schemas.openxmlformats.org/drawingml/2006/main" xmlns:r="http://schemas.openxmlformats.org/officeDocument/2006/relationships">
   <c:date1904 val="0"/>
-  <c:lang val="nl-NL"/>
+  <c:lang val="en-US"/>
   <c:roundedCorners val="0"/>
   <mc:AlternateContent xmlns:mc="http://schemas.openxmlformats.org/markup-compatibility/2006">
     <mc:Choice xmlns:c14="http://schemas.microsoft.com/office/drawing/2007/8/2/chart" Requires="c14">
@@ -2123,7 +2123,7 @@
                 <c:formatCode>General</c:formatCode>
                 <c:ptCount val="4"/>
                 <c:pt idx="0">
-                  <c:v>8.200000000000001</c:v>
+                  <c:v>8.2000000000000011</c:v>
                 </c:pt>
                 <c:pt idx="1">
                   <c:v>3.2</c:v>
@@ -2185,7 +2185,7 @@
               <a:cs typeface="+mn-cs"/>
             </a:defRPr>
           </a:pPr>
-          <a:endParaRPr lang="nl-NL"/>
+          <a:endParaRPr lang="en-US"/>
         </a:p>
       </c:txPr>
     </c:legend>
@@ -2207,7 +2207,7 @@
       <a:pPr>
         <a:defRPr/>
       </a:pPr>
-      <a:endParaRPr lang="nl-NL"/>
+      <a:endParaRPr lang="en-US"/>
     </a:p>
   </c:txPr>
   <c:externalData r:id="rId3">
@@ -2219,7 +2219,7 @@
 <file path=ppt/charts/chart5.xml><?xml version="1.0" encoding="utf-8"?>
 <c:chartSpace xmlns:c="http://schemas.openxmlformats.org/drawingml/2006/chart" xmlns:a="http://schemas.openxmlformats.org/drawingml/2006/main" xmlns:r="http://schemas.openxmlformats.org/officeDocument/2006/relationships">
   <c:date1904 val="0"/>
-  <c:lang val="nl-NL"/>
+  <c:lang val="en-US"/>
   <c:roundedCorners val="0"/>
   <mc:AlternateContent xmlns:mc="http://schemas.openxmlformats.org/markup-compatibility/2006">
     <mc:Choice xmlns:c14="http://schemas.microsoft.com/office/drawing/2007/8/2/chart" Requires="c14">
@@ -2306,7 +2306,7 @@
                     <a:cs typeface="+mn-cs"/>
                   </a:defRPr>
                 </a:pPr>
-                <a:endParaRPr lang="nl-NL"/>
+                <a:endParaRPr lang="en-US"/>
               </a:p>
             </c:txPr>
             <c:dLblPos val="inEnd"/>
@@ -2358,7 +2358,7 @@
                 <c:formatCode>General</c:formatCode>
                 <c:ptCount val="2"/>
                 <c:pt idx="0">
-                  <c:v>8.200000000000001</c:v>
+                  <c:v>8.2000000000000011</c:v>
                 </c:pt>
                 <c:pt idx="1">
                   <c:v>3.2</c:v>
@@ -2404,7 +2404,7 @@
       <a:pPr>
         <a:defRPr/>
       </a:pPr>
-      <a:endParaRPr lang="nl-NL"/>
+      <a:endParaRPr lang="en-US"/>
     </a:p>
   </c:txPr>
   <c:externalData r:id="rId3">
@@ -2416,7 +2416,7 @@
 <file path=ppt/charts/chart6.xml><?xml version="1.0" encoding="utf-8"?>
 <c:chartSpace xmlns:c="http://schemas.openxmlformats.org/drawingml/2006/chart" xmlns:a="http://schemas.openxmlformats.org/drawingml/2006/main" xmlns:r="http://schemas.openxmlformats.org/officeDocument/2006/relationships">
   <c:date1904 val="0"/>
-  <c:lang val="nl-NL"/>
+  <c:lang val="en-US"/>
   <c:roundedCorners val="0"/>
   <mc:AlternateContent xmlns:mc="http://schemas.openxmlformats.org/markup-compatibility/2006">
     <mc:Choice xmlns:c14="http://schemas.microsoft.com/office/drawing/2007/8/2/chart" Requires="c14">
@@ -2503,7 +2503,7 @@
                     <a:cs typeface="+mn-cs"/>
                   </a:defRPr>
                 </a:pPr>
-                <a:endParaRPr lang="nl-NL"/>
+                <a:endParaRPr lang="en-US"/>
               </a:p>
             </c:txPr>
             <c:showLegendKey val="0"/>
@@ -2600,7 +2600,7 @@
       <a:pPr>
         <a:defRPr/>
       </a:pPr>
-      <a:endParaRPr lang="nl-NL"/>
+      <a:endParaRPr lang="en-US"/>
     </a:p>
   </c:txPr>
   <c:externalData r:id="rId3">
@@ -2612,7 +2612,7 @@
 <file path=ppt/charts/chart7.xml><?xml version="1.0" encoding="utf-8"?>
 <c:chartSpace xmlns:c="http://schemas.openxmlformats.org/drawingml/2006/chart" xmlns:a="http://schemas.openxmlformats.org/drawingml/2006/main" xmlns:r="http://schemas.openxmlformats.org/officeDocument/2006/relationships">
   <c:date1904 val="0"/>
-  <c:lang val="nl-NL"/>
+  <c:lang val="en-US"/>
   <c:roundedCorners val="0"/>
   <mc:AlternateContent xmlns:mc="http://schemas.openxmlformats.org/markup-compatibility/2006">
     <mc:Choice xmlns:c14="http://schemas.microsoft.com/office/drawing/2007/8/2/chart" Requires="c14">
@@ -2699,7 +2699,7 @@
                     <a:cs typeface="+mn-cs"/>
                   </a:defRPr>
                 </a:pPr>
-                <a:endParaRPr lang="nl-NL"/>
+                <a:endParaRPr lang="en-US"/>
               </a:p>
             </c:txPr>
             <c:showLegendKey val="0"/>
@@ -2750,7 +2750,7 @@
                 <c:formatCode>General</c:formatCode>
                 <c:ptCount val="2"/>
                 <c:pt idx="0">
-                  <c:v>8.200000000000001</c:v>
+                  <c:v>8.2000000000000011</c:v>
                 </c:pt>
                 <c:pt idx="1">
                   <c:v>3.2</c:v>
@@ -2796,7 +2796,7 @@
       <a:pPr>
         <a:defRPr/>
       </a:pPr>
-      <a:endParaRPr lang="nl-NL"/>
+      <a:endParaRPr lang="en-US"/>
     </a:p>
   </c:txPr>
   <c:externalData r:id="rId3">
@@ -2808,7 +2808,7 @@
 <file path=ppt/charts/chart8.xml><?xml version="1.0" encoding="utf-8"?>
 <c:chartSpace xmlns:c="http://schemas.openxmlformats.org/drawingml/2006/chart" xmlns:a="http://schemas.openxmlformats.org/drawingml/2006/main" xmlns:r="http://schemas.openxmlformats.org/officeDocument/2006/relationships">
   <c:date1904 val="0"/>
-  <c:lang val="nl-NL"/>
+  <c:lang val="en-US"/>
   <c:roundedCorners val="0"/>
   <mc:AlternateContent xmlns:mc="http://schemas.openxmlformats.org/markup-compatibility/2006">
     <mc:Choice xmlns:c14="http://schemas.microsoft.com/office/drawing/2007/8/2/chart" Requires="c14">
@@ -2876,7 +2876,7 @@
               <a:cs typeface="+mn-cs"/>
             </a:defRPr>
           </a:pPr>
-          <a:endParaRPr lang="nl-NL"/>
+          <a:endParaRPr lang="en-US"/>
         </a:p>
       </c:txPr>
     </c:title>
@@ -3019,7 +3019,7 @@
                   <c:v>2.4</c:v>
                 </c:pt>
                 <c:pt idx="1">
-                  <c:v>4.4</c:v>
+                  <c:v>4.4000000000000004</c:v>
                 </c:pt>
                 <c:pt idx="2">
                   <c:v>1.8</c:v>
@@ -3088,16 +3088,16 @@
                 <c:formatCode>General</c:formatCode>
                 <c:ptCount val="4"/>
                 <c:pt idx="0">
-                  <c:v>2.0</c:v>
+                  <c:v>2</c:v>
                 </c:pt>
                 <c:pt idx="1">
-                  <c:v>2.0</c:v>
+                  <c:v>2</c:v>
                 </c:pt>
                 <c:pt idx="2">
-                  <c:v>3.0</c:v>
+                  <c:v>3</c:v>
                 </c:pt>
                 <c:pt idx="3">
-                  <c:v>5.0</c:v>
+                  <c:v>5</c:v>
                 </c:pt>
               </c:numCache>
             </c:numRef>
@@ -3113,11 +3113,11 @@
         </c:dLbls>
         <c:gapWidth val="468"/>
         <c:overlap val="-27"/>
-        <c:axId val="-2087740240"/>
-        <c:axId val="-2088527504"/>
+        <c:axId val="-147431552"/>
+        <c:axId val="-147039840"/>
       </c:barChart>
       <c:catAx>
-        <c:axId val="-2087740240"/>
+        <c:axId val="-147431552"/>
         <c:scaling>
           <c:orientation val="minMax"/>
         </c:scaling>
@@ -3157,10 +3157,10 @@
                 <a:cs typeface="+mn-cs"/>
               </a:defRPr>
             </a:pPr>
-            <a:endParaRPr lang="nl-NL"/>
+            <a:endParaRPr lang="en-US"/>
           </a:p>
         </c:txPr>
-        <c:crossAx val="-2088527504"/>
+        <c:crossAx val="-147039840"/>
         <c:crosses val="autoZero"/>
         <c:auto val="1"/>
         <c:lblAlgn val="ctr"/>
@@ -3168,7 +3168,7 @@
         <c:noMultiLvlLbl val="0"/>
       </c:catAx>
       <c:valAx>
-        <c:axId val="-2088527504"/>
+        <c:axId val="-147039840"/>
         <c:scaling>
           <c:orientation val="minMax"/>
         </c:scaling>
@@ -3211,10 +3211,10 @@
                 <a:cs typeface="+mn-cs"/>
               </a:defRPr>
             </a:pPr>
-            <a:endParaRPr lang="nl-NL"/>
+            <a:endParaRPr lang="en-US"/>
           </a:p>
         </c:txPr>
-        <c:crossAx val="-2087740240"/>
+        <c:crossAx val="-147431552"/>
         <c:crosses val="autoZero"/>
         <c:crossBetween val="between"/>
       </c:valAx>
@@ -3254,7 +3254,7 @@
               <a:cs typeface="+mn-cs"/>
             </a:defRPr>
           </a:pPr>
-          <a:endParaRPr lang="nl-NL"/>
+          <a:endParaRPr lang="en-US"/>
         </a:p>
       </c:txPr>
     </c:legend>
@@ -3276,7 +3276,7 @@
       <a:pPr>
         <a:defRPr/>
       </a:pPr>
-      <a:endParaRPr lang="nl-NL"/>
+      <a:endParaRPr lang="en-US"/>
     </a:p>
   </c:txPr>
   <c:externalData r:id="rId6">
@@ -3288,7 +3288,7 @@
 <file path=ppt/charts/chart9.xml><?xml version="1.0" encoding="utf-8"?>
 <c:chartSpace xmlns:c="http://schemas.openxmlformats.org/drawingml/2006/chart" xmlns:a="http://schemas.openxmlformats.org/drawingml/2006/main" xmlns:r="http://schemas.openxmlformats.org/officeDocument/2006/relationships">
   <c:date1904 val="0"/>
-  <c:lang val="nl-NL"/>
+  <c:lang val="en-US"/>
   <c:roundedCorners val="0"/>
   <mc:AlternateContent xmlns:mc="http://schemas.openxmlformats.org/markup-compatibility/2006">
     <mc:Choice xmlns:c14="http://schemas.microsoft.com/office/drawing/2007/8/2/chart" Requires="c14">
@@ -3351,8 +3351,8 @@
               <c:idx val="0"/>
               <c:layout>
                 <c:manualLayout>
-                  <c:x val="-0.171909340596524"/>
-                  <c:y val="-0.0940855346988769"/>
+                  <c:x val="-0.17190934059652399"/>
+                  <c:y val="-9.4085534698876899E-2"/>
                 </c:manualLayout>
               </c:layout>
               <c:showLegendKey val="0"/>
@@ -3393,7 +3393,7 @@
                     <a:cs typeface="+mn-cs"/>
                   </a:defRPr>
                 </a:pPr>
-                <a:endParaRPr lang="nl-NL"/>
+                <a:endParaRPr lang="en-US"/>
               </a:p>
             </c:txPr>
             <c:showLegendKey val="0"/>
@@ -3483,8 +3483,8 @@
               <c:idx val="0"/>
               <c:layout>
                 <c:manualLayout>
-                  <c:x val="-0.232309919725033"/>
-                  <c:y val="-0.292710552396506"/>
+                  <c:x val="-0.23230991972503301"/>
+                  <c:y val="-0.29271055239650601"/>
                 </c:manualLayout>
               </c:layout>
               <c:showLegendKey val="0"/>
@@ -3525,7 +3525,7 @@
                     <a:cs typeface="+mn-cs"/>
                   </a:defRPr>
                 </a:pPr>
-                <a:endParaRPr lang="nl-NL"/>
+                <a:endParaRPr lang="en-US"/>
               </a:p>
             </c:txPr>
             <c:showLegendKey val="0"/>
@@ -3615,8 +3615,8 @@
               <c:idx val="0"/>
               <c:layout>
                 <c:manualLayout>
-                  <c:x val="-0.241602316514034"/>
-                  <c:y val="-0.473912322927676"/>
+                  <c:x val="-0.24160231651403399"/>
+                  <c:y val="-0.47391232292767599"/>
                 </c:manualLayout>
               </c:layout>
               <c:showLegendKey val="0"/>
@@ -3657,7 +3657,7 @@
                     <a:cs typeface="+mn-cs"/>
                   </a:defRPr>
                 </a:pPr>
-                <a:endParaRPr lang="nl-NL"/>
+                <a:endParaRPr lang="en-US"/>
               </a:p>
             </c:txPr>
             <c:showLegendKey val="0"/>
@@ -3748,7 +3748,7 @@
               <c:layout>
                 <c:manualLayout>
                   <c:x val="-0.239279217316784"/>
-                  <c:y val="-0.609813650826054"/>
+                  <c:y val="-0.60981365082605399"/>
                 </c:manualLayout>
               </c:layout>
               <c:showLegendKey val="0"/>
@@ -3796,7 +3796,7 @@
                     <a:cs typeface="+mn-cs"/>
                   </a:defRPr>
                 </a:pPr>
-                <a:endParaRPr lang="nl-NL"/>
+                <a:endParaRPr lang="en-US"/>
               </a:p>
             </c:txPr>
             <c:showLegendKey val="0"/>
@@ -3878,7 +3878,7 @@
       <a:pPr>
         <a:defRPr/>
       </a:pPr>
-      <a:endParaRPr lang="nl-NL"/>
+      <a:endParaRPr lang="en-US"/>
     </a:p>
   </c:txPr>
   <c:externalData r:id="rId3">
@@ -12258,7 +12258,7 @@
           <a:p>
             <a:fld id="{13EF56E6-C67D-7746-9A34-D97F8BD73856}" type="datetimeFigureOut">
               <a:rPr lang="nl-NL" smtClean="0"/>
-              <a:t>08-12-15</a:t>
+              <a:t>15-12-2015</a:t>
             </a:fld>
             <a:endParaRPr lang="nl-NL"/>
           </a:p>
@@ -12417,7 +12417,7 @@
           <a:p>
             <a:fld id="{07AFDD2F-8185-AE44-B151-7DD2FEC944A2}" type="slidenum">
               <a:rPr lang="nl-NL" smtClean="0"/>
-              <a:t>‹nr.›</a:t>
+              <a:t>‹#›</a:t>
             </a:fld>
             <a:endParaRPr lang="nl-NL"/>
           </a:p>
@@ -13355,7 +13355,7 @@
           <a:p>
             <a:fld id="{FA2F5F57-D093-4DAE-BD96-8F9DB750D69B}" type="datetimeFigureOut">
               <a:rPr lang="zh-CN" altLang="en-US" smtClean="0"/>
-              <a:t>15/12/8</a:t>
+              <a:t>2015/12/15</a:t>
             </a:fld>
             <a:endParaRPr lang="zh-CN" altLang="en-US"/>
           </a:p>
@@ -13397,7 +13397,7 @@
           <a:p>
             <a:fld id="{AA692AF4-1282-45B3-92EA-7114EA10F338}" type="slidenum">
               <a:rPr lang="zh-CN" altLang="en-US" smtClean="0"/>
-              <a:t>‹nr.›</a:t>
+              <a:t>‹#›</a:t>
             </a:fld>
             <a:endParaRPr lang="zh-CN" altLang="en-US"/>
           </a:p>
@@ -13612,7 +13612,7 @@
           <a:p>
             <a:fld id="{FA2F5F57-D093-4DAE-BD96-8F9DB750D69B}" type="datetimeFigureOut">
               <a:rPr lang="zh-CN" altLang="en-US" smtClean="0"/>
-              <a:t>15/12/8</a:t>
+              <a:t>2015/12/15</a:t>
             </a:fld>
             <a:endParaRPr lang="zh-CN" altLang="en-US"/>
           </a:p>
@@ -13654,7 +13654,7 @@
           <a:p>
             <a:fld id="{AA692AF4-1282-45B3-92EA-7114EA10F338}" type="slidenum">
               <a:rPr lang="zh-CN" altLang="en-US" smtClean="0"/>
-              <a:t>‹nr.›</a:t>
+              <a:t>‹#›</a:t>
             </a:fld>
             <a:endParaRPr lang="zh-CN" altLang="en-US"/>
           </a:p>
@@ -13782,7 +13782,7 @@
           <a:p>
             <a:fld id="{FA2F5F57-D093-4DAE-BD96-8F9DB750D69B}" type="datetimeFigureOut">
               <a:rPr lang="zh-CN" altLang="en-US" smtClean="0"/>
-              <a:t>15/12/8</a:t>
+              <a:t>2015/12/15</a:t>
             </a:fld>
             <a:endParaRPr lang="zh-CN" altLang="en-US"/>
           </a:p>
@@ -13824,7 +13824,7 @@
           <a:p>
             <a:fld id="{AA692AF4-1282-45B3-92EA-7114EA10F338}" type="slidenum">
               <a:rPr lang="zh-CN" altLang="en-US" smtClean="0"/>
-              <a:t>‹nr.›</a:t>
+              <a:t>‹#›</a:t>
             </a:fld>
             <a:endParaRPr lang="zh-CN" altLang="en-US"/>
           </a:p>
@@ -13962,7 +13962,7 @@
           <a:p>
             <a:fld id="{FA2F5F57-D093-4DAE-BD96-8F9DB750D69B}" type="datetimeFigureOut">
               <a:rPr lang="zh-CN" altLang="en-US" smtClean="0"/>
-              <a:t>15/12/8</a:t>
+              <a:t>2015/12/15</a:t>
             </a:fld>
             <a:endParaRPr lang="zh-CN" altLang="en-US"/>
           </a:p>
@@ -14004,7 +14004,7 @@
           <a:p>
             <a:fld id="{AA692AF4-1282-45B3-92EA-7114EA10F338}" type="slidenum">
               <a:rPr lang="zh-CN" altLang="en-US" smtClean="0"/>
-              <a:t>‹nr.›</a:t>
+              <a:t>‹#›</a:t>
             </a:fld>
             <a:endParaRPr lang="zh-CN" altLang="en-US"/>
           </a:p>
@@ -14812,7 +14812,7 @@
           <a:p>
             <a:fld id="{FA2F5F57-D093-4DAE-BD96-8F9DB750D69B}" type="datetimeFigureOut">
               <a:rPr lang="zh-CN" altLang="en-US" smtClean="0"/>
-              <a:t>15/12/8</a:t>
+              <a:t>2015/12/15</a:t>
             </a:fld>
             <a:endParaRPr lang="zh-CN" altLang="en-US"/>
           </a:p>
@@ -14911,7 +14911,7 @@
           <a:p>
             <a:fld id="{FA2F5F57-D093-4DAE-BD96-8F9DB750D69B}" type="datetimeFigureOut">
               <a:rPr lang="zh-CN" altLang="en-US" smtClean="0"/>
-              <a:t>15/12/8</a:t>
+              <a:t>2015/12/15</a:t>
             </a:fld>
             <a:endParaRPr lang="zh-CN" altLang="en-US"/>
           </a:p>
@@ -15165,7 +15165,7 @@
           <a:p>
             <a:fld id="{FA2F5F57-D093-4DAE-BD96-8F9DB750D69B}" type="datetimeFigureOut">
               <a:rPr lang="zh-CN" altLang="en-US" smtClean="0"/>
-              <a:t>15/12/8</a:t>
+              <a:t>2015/12/15</a:t>
             </a:fld>
             <a:endParaRPr lang="zh-CN" altLang="en-US"/>
           </a:p>
@@ -15207,7 +15207,7 @@
           <a:p>
             <a:fld id="{AA692AF4-1282-45B3-92EA-7114EA10F338}" type="slidenum">
               <a:rPr lang="zh-CN" altLang="en-US" smtClean="0"/>
-              <a:t>‹nr.›</a:t>
+              <a:t>‹#›</a:t>
             </a:fld>
             <a:endParaRPr lang="zh-CN" altLang="en-US"/>
           </a:p>
@@ -15400,7 +15400,7 @@
           <a:p>
             <a:fld id="{FA2F5F57-D093-4DAE-BD96-8F9DB750D69B}" type="datetimeFigureOut">
               <a:rPr lang="zh-CN" altLang="en-US" smtClean="0"/>
-              <a:t>15/12/8</a:t>
+              <a:t>2015/12/15</a:t>
             </a:fld>
             <a:endParaRPr lang="zh-CN" altLang="en-US"/>
           </a:p>
@@ -15478,7 +15478,7 @@
           <a:p>
             <a:fld id="{AA692AF4-1282-45B3-92EA-7114EA10F338}" type="slidenum">
               <a:rPr lang="zh-CN" altLang="en-US" smtClean="0"/>
-              <a:t>‹nr.›</a:t>
+              <a:t>‹#›</a:t>
             </a:fld>
             <a:endParaRPr lang="zh-CN" altLang="en-US"/>
           </a:p>
@@ -17200,15 +17200,7 @@
                     <a:schemeClr val="bg1"/>
                   </a:solidFill>
                 </a:rPr>
-                <a:t> </a:t>
-              </a:r>
-              <a:r>
-                <a:rPr lang="en-US" altLang="zh-CN" sz="1200" dirty="0" smtClean="0">
-                  <a:solidFill>
-                    <a:schemeClr val="bg1"/>
-                  </a:solidFill>
-                </a:rPr>
-                <a:t>add text here</a:t>
+                <a:t> add text here</a:t>
               </a:r>
               <a:endParaRPr lang="zh-CN" altLang="en-US" sz="1200" dirty="0">
                 <a:solidFill>
@@ -22942,11 +22934,15 @@
             </a:r>
             <a:r>
               <a:rPr lang="en-US" altLang="zh-CN" sz="2400" dirty="0" err="1" smtClean="0"/>
-              <a:t>gebasseerd</a:t>
+              <a:t>gebaseerd</a:t>
             </a:r>
             <a:r>
               <a:rPr lang="en-US" altLang="zh-CN" sz="2400" dirty="0" smtClean="0"/>
-              <a:t> op </a:t>
+              <a:t> </a:t>
+            </a:r>
+            <a:r>
+              <a:rPr lang="en-US" altLang="zh-CN" sz="2400" dirty="0" smtClean="0"/>
+              <a:t>op </a:t>
             </a:r>
             <a:r>
               <a:rPr lang="en-US" altLang="zh-CN" sz="2400" dirty="0" err="1" smtClean="0"/>

</xml_diff>